<commit_message>
Added indicators table and time frames
</commit_message>
<xml_diff>
--- a/OPAR/WORKSPACE/INTREP VIS OPAR-001 - Syrian ground combat tactics.pptx
+++ b/OPAR/WORKSPACE/INTREP VIS OPAR-001 - Syrian ground combat tactics.pptx
@@ -203,7 +203,7 @@
             <a:fld id="{40637A30-8EE1-4060-9976-8832FC89EE34}" type="datetimeFigureOut">
               <a:rPr lang="nb-NO" smtClean="0"/>
               <a:pPr/>
-              <a:t>28.08.2020</a:t>
+              <a:t>31.08.2020</a:t>
             </a:fld>
             <a:endParaRPr lang="nb-NO"/>
           </a:p>
@@ -4269,7 +4269,7 @@
         </p:nvSpPr>
         <p:spPr>
           <a:xfrm>
-            <a:off x="0" y="642924"/>
+            <a:off x="0" y="624115"/>
             <a:ext cx="8786842" cy="4286280"/>
           </a:xfrm>
           <a:prstGeom prst="rect">
@@ -4285,153 +4285,6 @@
             <a:normAutofit/>
           </a:bodyPr>
           <a:lstStyle/>
-          <a:p>
-            <a:pPr>
-              <a:buFont typeface="Arial" pitchFamily="34" charset="0"/>
-              <a:buChar char="•"/>
-            </a:pPr>
-            <a:r>
-              <a:rPr lang="nb-NO" sz="1200" dirty="0"/>
-              <a:t>BM-21 launch or movement into firing positions. </a:t>
-            </a:r>
-          </a:p>
-          <a:p>
-            <a:pPr lvl="1">
-              <a:buFont typeface="Arial" pitchFamily="34" charset="0"/>
-              <a:buChar char="•"/>
-            </a:pPr>
-            <a:r>
-              <a:rPr lang="nb-NO" sz="1200" dirty="0"/>
-              <a:t>Preparing offensive / Attack</a:t>
-            </a:r>
-          </a:p>
-          <a:p>
-            <a:pPr>
-              <a:buFont typeface="Arial" pitchFamily="34" charset="0"/>
-              <a:buChar char="•"/>
-            </a:pPr>
-            <a:r>
-              <a:rPr lang="nb-NO" sz="1200" dirty="0"/>
-              <a:t>RW activity deep into enemy territory</a:t>
-            </a:r>
-          </a:p>
-          <a:p>
-            <a:pPr lvl="1">
-              <a:buFont typeface="Arial" pitchFamily="34" charset="0"/>
-              <a:buChar char="•"/>
-            </a:pPr>
-            <a:r>
-              <a:rPr lang="nb-NO" sz="1200" dirty="0"/>
-              <a:t>Insertion of Long Range Recon</a:t>
-            </a:r>
-          </a:p>
-          <a:p>
-            <a:pPr>
-              <a:buFont typeface="Arial" pitchFamily="34" charset="0"/>
-              <a:buChar char="•"/>
-            </a:pPr>
-            <a:r>
-              <a:rPr lang="nb-NO" sz="1200" dirty="0"/>
-              <a:t>FW (transport) activity deep into enemy territory</a:t>
-            </a:r>
-          </a:p>
-          <a:p>
-            <a:pPr lvl="1">
-              <a:buFont typeface="Arial" pitchFamily="34" charset="0"/>
-              <a:buChar char="•"/>
-            </a:pPr>
-            <a:r>
-              <a:rPr lang="nb-NO" sz="1200" dirty="0"/>
-              <a:t>Airborne Assault ( Many FW transports)</a:t>
-            </a:r>
-          </a:p>
-          <a:p>
-            <a:pPr lvl="1">
-              <a:buFont typeface="Arial" pitchFamily="34" charset="0"/>
-              <a:buChar char="•"/>
-            </a:pPr>
-            <a:r>
-              <a:rPr lang="nb-NO" sz="1200" dirty="0"/>
-              <a:t>Long range Recon ( If only a single AC is in use, or flying tactical, low level)</a:t>
-            </a:r>
-          </a:p>
-          <a:p>
-            <a:pPr>
-              <a:buFont typeface="Arial" pitchFamily="34" charset="0"/>
-              <a:buChar char="•"/>
-            </a:pPr>
-            <a:r>
-              <a:rPr lang="nb-NO" sz="1200" dirty="0"/>
-              <a:t>Artillery at a certain point (point target)</a:t>
-            </a:r>
-          </a:p>
-          <a:p>
-            <a:pPr lvl="1">
-              <a:buFont typeface="Arial" pitchFamily="34" charset="0"/>
-              <a:buChar char="•"/>
-            </a:pPr>
-            <a:r>
-              <a:rPr lang="nb-NO" sz="1200" dirty="0"/>
-              <a:t>Trying to kill the target</a:t>
-            </a:r>
-          </a:p>
-          <a:p>
-            <a:pPr>
-              <a:buFont typeface="Arial" pitchFamily="34" charset="0"/>
-              <a:buChar char="•"/>
-            </a:pPr>
-            <a:r>
-              <a:rPr lang="nb-NO" sz="1200" dirty="0"/>
-              <a:t>Artillery at an area</a:t>
-            </a:r>
-          </a:p>
-          <a:p>
-            <a:pPr lvl="1">
-              <a:buFont typeface="Arial" pitchFamily="34" charset="0"/>
-              <a:buChar char="•"/>
-            </a:pPr>
-            <a:r>
-              <a:rPr lang="nb-NO" sz="1200" dirty="0"/>
-              <a:t>Suppression, to cover for movement / attack</a:t>
-            </a:r>
-          </a:p>
-          <a:p>
-            <a:pPr>
-              <a:buFont typeface="Arial" pitchFamily="34" charset="0"/>
-              <a:buChar char="•"/>
-            </a:pPr>
-            <a:endParaRPr lang="nb-NO" sz="1200" dirty="0"/>
-          </a:p>
-          <a:p>
-            <a:pPr>
-              <a:buFont typeface="Arial" pitchFamily="34" charset="0"/>
-              <a:buChar char="•"/>
-            </a:pPr>
-            <a:r>
-              <a:rPr lang="nb-NO" sz="1200" dirty="0"/>
-              <a:t>Artillery units in firing position (spread out, IAW a template)</a:t>
-            </a:r>
-          </a:p>
-          <a:p>
-            <a:pPr>
-              <a:buFont typeface="Arial" pitchFamily="34" charset="0"/>
-              <a:buChar char="•"/>
-            </a:pPr>
-            <a:r>
-              <a:rPr lang="nb-NO" sz="1200" dirty="0"/>
-              <a:t>General convoy movement</a:t>
-            </a:r>
-          </a:p>
-          <a:p>
-            <a:pPr lvl="1">
-              <a:buFont typeface="Arial" pitchFamily="34" charset="0"/>
-              <a:buChar char="•"/>
-            </a:pPr>
-            <a:r>
-              <a:rPr lang="nb-NO" sz="1200" dirty="0"/>
-              <a:t>Upcoming action (offensive), in a certian amount of time</a:t>
-            </a:r>
-          </a:p>
           <a:p>
             <a:pPr>
               <a:buFont typeface="Arial" pitchFamily="34" charset="0"/>
@@ -5080,8 +4933,8 @@
         </p:nvSpPr>
         <p:spPr>
           <a:xfrm rot="18996742">
-            <a:off x="4143482" y="1722033"/>
-            <a:ext cx="4374292" cy="1323439"/>
+            <a:off x="4143482" y="2029809"/>
+            <a:ext cx="4374292" cy="707886"/>
           </a:xfrm>
           <a:prstGeom prst="rect">
             <a:avLst/>
@@ -5101,7 +4954,7 @@
                 </a:solidFill>
                 <a:latin typeface="Arial Black" pitchFamily="34" charset="0"/>
               </a:rPr>
-              <a:t>DRAFT (Redundant?)</a:t>
+              <a:t>DRAFT</a:t>
             </a:r>
             <a:endParaRPr lang="en-US" sz="4000" b="1" dirty="0">
               <a:solidFill>
@@ -5112,6 +4965,605 @@
           </a:p>
         </p:txBody>
       </p:sp>
+      <p:graphicFrame>
+        <p:nvGraphicFramePr>
+          <p:cNvPr id="3" name="טבלה 2"/>
+          <p:cNvGraphicFramePr>
+            <a:graphicFrameLocks noGrp="1"/>
+          </p:cNvGraphicFramePr>
+          <p:nvPr>
+            <p:extLst>
+              <p:ext uri="{D42A27DB-BD31-4B8C-83A1-F6EECF244321}">
+                <p14:modId xmlns:p14="http://schemas.microsoft.com/office/powerpoint/2010/main" val="253851099"/>
+              </p:ext>
+            </p:extLst>
+          </p:nvPr>
+        </p:nvGraphicFramePr>
+        <p:xfrm>
+          <a:off x="404135" y="624115"/>
+          <a:ext cx="8187818" cy="4389185"/>
+        </p:xfrm>
+        <a:graphic>
+          <a:graphicData uri="http://schemas.openxmlformats.org/drawingml/2006/table">
+            <a:tbl>
+              <a:tblPr rtl="1" firstRow="1" bandRow="1">
+                <a:tableStyleId>{073A0DAA-6AF3-43AB-8588-CEC1D06C72B9}</a:tableStyleId>
+              </a:tblPr>
+              <a:tblGrid>
+                <a:gridCol w="4877626"/>
+                <a:gridCol w="3310192"/>
+              </a:tblGrid>
+              <a:tr h="523305">
+                <a:tc>
+                  <a:txBody>
+                    <a:bodyPr/>
+                    <a:lstStyle/>
+                    <a:p>
+                      <a:pPr algn="l" rtl="0"/>
+                      <a:r>
+                        <a:rPr lang="en-US" dirty="0" smtClean="0"/>
+                        <a:t>Indication</a:t>
+                      </a:r>
+                      <a:endParaRPr lang="he-IL" dirty="0"/>
+                    </a:p>
+                  </a:txBody>
+                  <a:tcPr anchor="ctr"/>
+                </a:tc>
+                <a:tc>
+                  <a:txBody>
+                    <a:bodyPr/>
+                    <a:lstStyle/>
+                    <a:p>
+                      <a:pPr algn="l" rtl="0"/>
+                      <a:r>
+                        <a:rPr lang="en-US" dirty="0" smtClean="0"/>
+                        <a:t>Observed/reported</a:t>
+                      </a:r>
+                      <a:r>
+                        <a:rPr lang="en-US" baseline="0" dirty="0" smtClean="0"/>
+                        <a:t> activity</a:t>
+                      </a:r>
+                      <a:endParaRPr lang="he-IL" dirty="0"/>
+                    </a:p>
+                  </a:txBody>
+                  <a:tcPr anchor="ctr"/>
+                </a:tc>
+              </a:tr>
+              <a:tr h="370840">
+                <a:tc>
+                  <a:txBody>
+                    <a:bodyPr/>
+                    <a:lstStyle/>
+                    <a:p>
+                      <a:pPr marL="0" marR="0" lvl="1" indent="0" algn="l" defTabSz="914400" rtl="0" eaLnBrk="1" fontAlgn="auto" latinLnBrk="0" hangingPunct="1">
+                        <a:lnSpc>
+                          <a:spcPct val="100000"/>
+                        </a:lnSpc>
+                        <a:spcBef>
+                          <a:spcPts val="0"/>
+                        </a:spcBef>
+                        <a:spcAft>
+                          <a:spcPts val="0"/>
+                        </a:spcAft>
+                        <a:buClrTx/>
+                        <a:buSzTx/>
+                        <a:buFontTx/>
+                        <a:buNone/>
+                        <a:tabLst/>
+                        <a:defRPr/>
+                      </a:pPr>
+                      <a:r>
+                        <a:rPr lang="he-IL" sz="1200" dirty="0" smtClean="0"/>
+                        <a:t> </a:t>
+                      </a:r>
+                      <a:r>
+                        <a:rPr lang="nb-NO" sz="1200" dirty="0" smtClean="0"/>
+                        <a:t>Preparing offensive / Attack </a:t>
+                      </a:r>
+                    </a:p>
+                    <a:p>
+                      <a:pPr marL="0" marR="0" lvl="1" indent="0" algn="l" defTabSz="914400" rtl="0" eaLnBrk="1" fontAlgn="auto" latinLnBrk="0" hangingPunct="1">
+                        <a:lnSpc>
+                          <a:spcPct val="100000"/>
+                        </a:lnSpc>
+                        <a:spcBef>
+                          <a:spcPts val="0"/>
+                        </a:spcBef>
+                        <a:spcAft>
+                          <a:spcPts val="0"/>
+                        </a:spcAft>
+                        <a:buClrTx/>
+                        <a:buSzTx/>
+                        <a:buFontTx/>
+                        <a:buNone/>
+                        <a:tabLst/>
+                        <a:defRPr/>
+                      </a:pPr>
+                      <a:r>
+                        <a:rPr lang="nb-NO" sz="1200" dirty="0" smtClean="0"/>
+                        <a:t>(1-2</a:t>
+                      </a:r>
+                      <a:r>
+                        <a:rPr lang="nb-NO" sz="1200" baseline="0" dirty="0" smtClean="0"/>
+                        <a:t> hours prior to offensive maneuver begins)</a:t>
+                      </a:r>
+                      <a:endParaRPr lang="nb-NO" sz="1200" dirty="0" smtClean="0"/>
+                    </a:p>
+                  </a:txBody>
+                  <a:tcPr anchor="ctr"/>
+                </a:tc>
+                <a:tc>
+                  <a:txBody>
+                    <a:bodyPr/>
+                    <a:lstStyle/>
+                    <a:p>
+                      <a:pPr algn="l" rtl="0">
+                        <a:buFont typeface="Arial" pitchFamily="34" charset="0"/>
+                        <a:buNone/>
+                      </a:pPr>
+                      <a:r>
+                        <a:rPr lang="nb-NO" sz="1200" dirty="0" smtClean="0"/>
+                        <a:t>BM-21 launch or movement into firing positions. </a:t>
+                      </a:r>
+                    </a:p>
+                  </a:txBody>
+                  <a:tcPr anchor="ctr"/>
+                </a:tc>
+              </a:tr>
+              <a:tr h="370840">
+                <a:tc>
+                  <a:txBody>
+                    <a:bodyPr/>
+                    <a:lstStyle/>
+                    <a:p>
+                      <a:pPr marL="0" marR="0" lvl="1" indent="0" algn="l" defTabSz="914400" rtl="0" eaLnBrk="1" fontAlgn="auto" latinLnBrk="0" hangingPunct="1">
+                        <a:lnSpc>
+                          <a:spcPct val="100000"/>
+                        </a:lnSpc>
+                        <a:spcBef>
+                          <a:spcPts val="0"/>
+                        </a:spcBef>
+                        <a:spcAft>
+                          <a:spcPts val="0"/>
+                        </a:spcAft>
+                        <a:buClrTx/>
+                        <a:buSzTx/>
+                        <a:buFontTx/>
+                        <a:buNone/>
+                        <a:tabLst/>
+                        <a:defRPr/>
+                      </a:pPr>
+                      <a:r>
+                        <a:rPr lang="nb-NO" sz="1200" dirty="0" smtClean="0"/>
+                        <a:t>Insertion of Long Range Recon</a:t>
+                      </a:r>
+                    </a:p>
+                    <a:p>
+                      <a:pPr marL="0" marR="0" lvl="1" indent="0" algn="l" defTabSz="914400" rtl="0" eaLnBrk="1" fontAlgn="auto" latinLnBrk="0" hangingPunct="1">
+                        <a:lnSpc>
+                          <a:spcPct val="100000"/>
+                        </a:lnSpc>
+                        <a:spcBef>
+                          <a:spcPts val="0"/>
+                        </a:spcBef>
+                        <a:spcAft>
+                          <a:spcPts val="0"/>
+                        </a:spcAft>
+                        <a:buClrTx/>
+                        <a:buSzTx/>
+                        <a:buFontTx/>
+                        <a:buNone/>
+                        <a:tabLst/>
+                        <a:defRPr/>
+                      </a:pPr>
+                      <a:r>
+                        <a:rPr lang="nb-NO" sz="1200" dirty="0" smtClean="0"/>
+                        <a:t>(0-96 hrs prior to offensive)</a:t>
+                      </a:r>
+                    </a:p>
+                  </a:txBody>
+                  <a:tcPr anchor="ctr"/>
+                </a:tc>
+                <a:tc>
+                  <a:txBody>
+                    <a:bodyPr/>
+                    <a:lstStyle/>
+                    <a:p>
+                      <a:pPr algn="l" rtl="0">
+                        <a:buFont typeface="Arial" pitchFamily="34" charset="0"/>
+                        <a:buNone/>
+                      </a:pPr>
+                      <a:r>
+                        <a:rPr lang="nb-NO" sz="1200" dirty="0" smtClean="0"/>
+                        <a:t>RW activity deep into enemy territory</a:t>
+                      </a:r>
+                    </a:p>
+                  </a:txBody>
+                  <a:tcPr anchor="ctr"/>
+                </a:tc>
+              </a:tr>
+              <a:tr h="370840">
+                <a:tc>
+                  <a:txBody>
+                    <a:bodyPr/>
+                    <a:lstStyle/>
+                    <a:p>
+                      <a:pPr lvl="0">
+                        <a:buFont typeface="Arial" pitchFamily="34" charset="0"/>
+                        <a:buNone/>
+                      </a:pPr>
+                      <a:r>
+                        <a:rPr lang="nb-NO" sz="1200" dirty="0" smtClean="0"/>
+                        <a:t>*Airborne Assault ( Many FW transports)</a:t>
+                      </a:r>
+                    </a:p>
+                    <a:p>
+                      <a:pPr lvl="0">
+                        <a:buFont typeface="Arial" pitchFamily="34" charset="0"/>
+                        <a:buNone/>
+                      </a:pPr>
+                      <a:r>
+                        <a:rPr lang="nb-NO" sz="1200" dirty="0" smtClean="0"/>
+                        <a:t>*</a:t>
+                      </a:r>
+                      <a:r>
+                        <a:rPr lang="nb-NO" sz="1200" baseline="0" dirty="0" smtClean="0"/>
+                        <a:t> </a:t>
+                      </a:r>
+                      <a:r>
+                        <a:rPr lang="nb-NO" sz="1200" dirty="0" smtClean="0"/>
+                        <a:t>Long range Recon ( If only a single AC is in use, or flying tactical, low level)</a:t>
+                      </a:r>
+                    </a:p>
+                  </a:txBody>
+                  <a:tcPr anchor="ctr"/>
+                </a:tc>
+                <a:tc>
+                  <a:txBody>
+                    <a:bodyPr/>
+                    <a:lstStyle/>
+                    <a:p>
+                      <a:pPr>
+                        <a:buFont typeface="Arial" pitchFamily="34" charset="0"/>
+                        <a:buNone/>
+                      </a:pPr>
+                      <a:r>
+                        <a:rPr lang="nb-NO" sz="1200" dirty="0" smtClean="0"/>
+                        <a:t>FW (transport) activity deep into enemy territory</a:t>
+                      </a:r>
+                    </a:p>
+                  </a:txBody>
+                  <a:tcPr anchor="ctr"/>
+                </a:tc>
+              </a:tr>
+              <a:tr h="370840">
+                <a:tc>
+                  <a:txBody>
+                    <a:bodyPr/>
+                    <a:lstStyle/>
+                    <a:p>
+                      <a:pPr marL="0" marR="0" lvl="1" indent="0" algn="l" defTabSz="914400" rtl="0" eaLnBrk="1" fontAlgn="auto" latinLnBrk="0" hangingPunct="1">
+                        <a:lnSpc>
+                          <a:spcPct val="100000"/>
+                        </a:lnSpc>
+                        <a:spcBef>
+                          <a:spcPts val="0"/>
+                        </a:spcBef>
+                        <a:spcAft>
+                          <a:spcPts val="0"/>
+                        </a:spcAft>
+                        <a:buClrTx/>
+                        <a:buSzTx/>
+                        <a:buFontTx/>
+                        <a:buNone/>
+                        <a:tabLst/>
+                        <a:defRPr/>
+                      </a:pPr>
+                      <a:r>
+                        <a:rPr lang="nb-NO" sz="1200" dirty="0" smtClean="0"/>
+                        <a:t>Trying to kill the target</a:t>
+                      </a:r>
+                    </a:p>
+                  </a:txBody>
+                  <a:tcPr anchor="ctr"/>
+                </a:tc>
+                <a:tc>
+                  <a:txBody>
+                    <a:bodyPr/>
+                    <a:lstStyle/>
+                    <a:p>
+                      <a:pPr>
+                        <a:buFont typeface="Arial" pitchFamily="34" charset="0"/>
+                        <a:buNone/>
+                      </a:pPr>
+                      <a:r>
+                        <a:rPr lang="nb-NO" sz="1200" dirty="0" smtClean="0"/>
+                        <a:t>Artillery at a certain point (point target)</a:t>
+                      </a:r>
+                    </a:p>
+                  </a:txBody>
+                  <a:tcPr anchor="ctr"/>
+                </a:tc>
+              </a:tr>
+              <a:tr h="370840">
+                <a:tc>
+                  <a:txBody>
+                    <a:bodyPr/>
+                    <a:lstStyle/>
+                    <a:p>
+                      <a:pPr marL="0" marR="0" lvl="1" indent="0" algn="l" defTabSz="914400" rtl="0" eaLnBrk="1" fontAlgn="auto" latinLnBrk="0" hangingPunct="1">
+                        <a:lnSpc>
+                          <a:spcPct val="100000"/>
+                        </a:lnSpc>
+                        <a:spcBef>
+                          <a:spcPts val="0"/>
+                        </a:spcBef>
+                        <a:spcAft>
+                          <a:spcPts val="0"/>
+                        </a:spcAft>
+                        <a:buClrTx/>
+                        <a:buSzTx/>
+                        <a:buFontTx/>
+                        <a:buNone/>
+                        <a:tabLst/>
+                        <a:defRPr/>
+                      </a:pPr>
+                      <a:r>
+                        <a:rPr lang="nb-NO" sz="1200" dirty="0" smtClean="0"/>
+                        <a:t>Suppression, to cover for movement / attack</a:t>
+                      </a:r>
+                    </a:p>
+                  </a:txBody>
+                  <a:tcPr anchor="ctr"/>
+                </a:tc>
+                <a:tc>
+                  <a:txBody>
+                    <a:bodyPr/>
+                    <a:lstStyle/>
+                    <a:p>
+                      <a:pPr>
+                        <a:buFont typeface="Arial" pitchFamily="34" charset="0"/>
+                        <a:buNone/>
+                      </a:pPr>
+                      <a:r>
+                        <a:rPr lang="nb-NO" sz="1200" dirty="0" smtClean="0"/>
+                        <a:t>Artillery at an area</a:t>
+                      </a:r>
+                    </a:p>
+                  </a:txBody>
+                  <a:tcPr anchor="ctr"/>
+                </a:tc>
+              </a:tr>
+              <a:tr h="370840">
+                <a:tc>
+                  <a:txBody>
+                    <a:bodyPr/>
+                    <a:lstStyle/>
+                    <a:p>
+                      <a:pPr lvl="0">
+                        <a:buFont typeface="Arial" pitchFamily="34" charset="0"/>
+                        <a:buNone/>
+                      </a:pPr>
+                      <a:r>
+                        <a:rPr lang="nb-NO" sz="1200" dirty="0" smtClean="0"/>
+                        <a:t>Upcoming division-level</a:t>
+                      </a:r>
+                      <a:r>
+                        <a:rPr lang="nb-NO" sz="1200" baseline="0" dirty="0" smtClean="0"/>
+                        <a:t> </a:t>
+                      </a:r>
+                      <a:r>
+                        <a:rPr lang="nb-NO" sz="1200" dirty="0" smtClean="0"/>
+                        <a:t>offensive within 0-48 hrs</a:t>
+                      </a:r>
+                      <a:endParaRPr lang="nb-NO" sz="1200" dirty="0" smtClean="0"/>
+                    </a:p>
+                  </a:txBody>
+                  <a:tcPr anchor="ctr"/>
+                </a:tc>
+                <a:tc>
+                  <a:txBody>
+                    <a:bodyPr/>
+                    <a:lstStyle/>
+                    <a:p>
+                      <a:pPr>
+                        <a:buFont typeface="Arial" pitchFamily="34" charset="0"/>
+                        <a:buNone/>
+                      </a:pPr>
+                      <a:r>
+                        <a:rPr lang="nb-NO" sz="1200" dirty="0" smtClean="0"/>
+                        <a:t>Convoys</a:t>
+                      </a:r>
+                      <a:r>
+                        <a:rPr lang="nb-NO" sz="1200" baseline="0" dirty="0" smtClean="0"/>
+                        <a:t> of division-level supply</a:t>
+                      </a:r>
+                      <a:endParaRPr lang="nb-NO" sz="1200" dirty="0" smtClean="0"/>
+                    </a:p>
+                  </a:txBody>
+                  <a:tcPr anchor="ctr"/>
+                </a:tc>
+              </a:tr>
+              <a:tr h="370840">
+                <a:tc>
+                  <a:txBody>
+                    <a:bodyPr/>
+                    <a:lstStyle/>
+                    <a:p>
+                      <a:pPr lvl="0">
+                        <a:buFont typeface="Arial" pitchFamily="34" charset="0"/>
+                        <a:buNone/>
+                      </a:pPr>
+                      <a:r>
+                        <a:rPr lang="nb-NO" sz="1200" dirty="0" smtClean="0"/>
+                        <a:t>Upcoming </a:t>
+                      </a:r>
+                      <a:r>
+                        <a:rPr lang="nb-NO" sz="1200" dirty="0" smtClean="0"/>
+                        <a:t>regiment-level offensive within 0-24 </a:t>
+                      </a:r>
+                      <a:r>
+                        <a:rPr lang="nb-NO" sz="1200" dirty="0" smtClean="0"/>
+                        <a:t>hrs</a:t>
+                      </a:r>
+                    </a:p>
+                  </a:txBody>
+                  <a:tcPr anchor="ctr"/>
+                </a:tc>
+                <a:tc>
+                  <a:txBody>
+                    <a:bodyPr/>
+                    <a:lstStyle/>
+                    <a:p>
+                      <a:pPr>
+                        <a:buFont typeface="Arial" pitchFamily="34" charset="0"/>
+                        <a:buNone/>
+                      </a:pPr>
+                      <a:r>
+                        <a:rPr lang="nb-NO" sz="1200" dirty="0" smtClean="0"/>
+                        <a:t>Convoys</a:t>
+                      </a:r>
+                      <a:r>
+                        <a:rPr lang="nb-NO" sz="1200" baseline="0" dirty="0" smtClean="0"/>
+                        <a:t> of </a:t>
+                      </a:r>
+                      <a:r>
+                        <a:rPr lang="nb-NO" sz="1200" baseline="0" dirty="0" smtClean="0"/>
+                        <a:t>regiment-level supply</a:t>
+                      </a:r>
+                      <a:endParaRPr lang="nb-NO" sz="1200" dirty="0" smtClean="0"/>
+                    </a:p>
+                  </a:txBody>
+                  <a:tcPr anchor="ctr"/>
+                </a:tc>
+              </a:tr>
+              <a:tr h="370840">
+                <a:tc>
+                  <a:txBody>
+                    <a:bodyPr/>
+                    <a:lstStyle/>
+                    <a:p>
+                      <a:pPr marL="0" marR="0" lvl="1" indent="0" algn="l" defTabSz="914400" rtl="0" eaLnBrk="1" fontAlgn="auto" latinLnBrk="0" hangingPunct="1">
+                        <a:lnSpc>
+                          <a:spcPct val="100000"/>
+                        </a:lnSpc>
+                        <a:spcBef>
+                          <a:spcPts val="0"/>
+                        </a:spcBef>
+                        <a:spcAft>
+                          <a:spcPts val="0"/>
+                        </a:spcAft>
+                        <a:buClrTx/>
+                        <a:buSzTx/>
+                        <a:buFontTx/>
+                        <a:buNone/>
+                        <a:tabLst/>
+                        <a:defRPr/>
+                      </a:pPr>
+                      <a:r>
+                        <a:rPr lang="nb-NO" sz="1200" dirty="0" smtClean="0"/>
+                        <a:t>Setting</a:t>
+                      </a:r>
+                      <a:r>
+                        <a:rPr lang="nb-NO" sz="1200" baseline="0" dirty="0" smtClean="0"/>
+                        <a:t> up for offensive </a:t>
+                      </a:r>
+                      <a:endParaRPr lang="nb-NO" sz="1200" dirty="0" smtClean="0"/>
+                    </a:p>
+                  </a:txBody>
+                  <a:tcPr anchor="ctr"/>
+                </a:tc>
+                <a:tc>
+                  <a:txBody>
+                    <a:bodyPr/>
+                    <a:lstStyle/>
+                    <a:p>
+                      <a:pPr>
+                        <a:buFont typeface="Arial" pitchFamily="34" charset="0"/>
+                        <a:buNone/>
+                      </a:pPr>
+                      <a:r>
+                        <a:rPr lang="nb-NO" sz="1200" dirty="0" smtClean="0"/>
+                        <a:t>Manuevering</a:t>
+                      </a:r>
+                      <a:r>
+                        <a:rPr lang="nb-NO" sz="1200" baseline="0" dirty="0" smtClean="0"/>
+                        <a:t> units assuming assault formations</a:t>
+                      </a:r>
+                      <a:endParaRPr lang="nb-NO" sz="1200" dirty="0" smtClean="0"/>
+                    </a:p>
+                  </a:txBody>
+                  <a:tcPr anchor="ctr"/>
+                </a:tc>
+              </a:tr>
+              <a:tr h="370840">
+                <a:tc>
+                  <a:txBody>
+                    <a:bodyPr/>
+                    <a:lstStyle/>
+                    <a:p>
+                      <a:pPr marL="0" marR="0" lvl="1" indent="0" algn="l" defTabSz="914400" rtl="0" eaLnBrk="1" fontAlgn="auto" latinLnBrk="0" hangingPunct="1">
+                        <a:lnSpc>
+                          <a:spcPct val="100000"/>
+                        </a:lnSpc>
+                        <a:spcBef>
+                          <a:spcPts val="0"/>
+                        </a:spcBef>
+                        <a:spcAft>
+                          <a:spcPts val="0"/>
+                        </a:spcAft>
+                        <a:buClrTx/>
+                        <a:buSzTx/>
+                        <a:buFontTx/>
+                        <a:buNone/>
+                        <a:tabLst/>
+                        <a:defRPr/>
+                      </a:pPr>
+                      <a:r>
+                        <a:rPr lang="nb-NO" sz="1200" dirty="0" smtClean="0"/>
+                        <a:t>Division</a:t>
+                      </a:r>
+                      <a:r>
+                        <a:rPr lang="nb-NO" sz="1200" baseline="0" dirty="0" smtClean="0"/>
+                        <a:t> is resupplying in preparation for further missions (Duration up to 72 hrs)</a:t>
+                      </a:r>
+                      <a:endParaRPr lang="nb-NO" sz="1200" dirty="0" smtClean="0"/>
+                    </a:p>
+                  </a:txBody>
+                  <a:tcPr anchor="ctr"/>
+                </a:tc>
+                <a:tc>
+                  <a:txBody>
+                    <a:bodyPr/>
+                    <a:lstStyle/>
+                    <a:p>
+                      <a:pPr marL="0" indent="0">
+                        <a:buFontTx/>
+                        <a:buNone/>
+                      </a:pPr>
+                      <a:r>
+                        <a:rPr lang="nb-NO" sz="1200" dirty="0" smtClean="0"/>
+                        <a:t>* Combat vehicles arranged in non-combat formations (lines/raws, tight together)</a:t>
+                      </a:r>
+                    </a:p>
+                    <a:p>
+                      <a:pPr marL="0" indent="0">
+                        <a:buFontTx/>
+                        <a:buNone/>
+                      </a:pPr>
+                      <a:r>
+                        <a:rPr lang="nb-NO" sz="1200" dirty="0" smtClean="0"/>
+                        <a:t>* Supply trucks in close vicinity</a:t>
+                      </a:r>
+                    </a:p>
+                  </a:txBody>
+                  <a:tcPr anchor="ctr"/>
+                </a:tc>
+              </a:tr>
+            </a:tbl>
+          </a:graphicData>
+        </a:graphic>
+      </p:graphicFrame>
     </p:spTree>
   </p:cSld>
   <p:clrMapOvr>
@@ -8308,46 +8760,6 @@
               </a:rPr>
               <a:t>A second BN of SA-8 will be close to the divisional Rocket-ARTY BN, defending it.</a:t>
             </a:r>
-          </a:p>
-        </p:txBody>
-      </p:sp>
-      <p:sp>
-        <p:nvSpPr>
-          <p:cNvPr id="32" name="TekstSylinder 9"/>
-          <p:cNvSpPr txBox="1"/>
-          <p:nvPr/>
-        </p:nvSpPr>
-        <p:spPr>
-          <a:xfrm rot="18996742">
-            <a:off x="5420137" y="1745194"/>
-            <a:ext cx="2423186" cy="707886"/>
-          </a:xfrm>
-          <a:prstGeom prst="rect">
-            <a:avLst/>
-          </a:prstGeom>
-          <a:noFill/>
-        </p:spPr>
-        <p:txBody>
-          <a:bodyPr wrap="square" rtlCol="0">
-            <a:spAutoFit/>
-          </a:bodyPr>
-          <a:lstStyle/>
-          <a:p>
-            <a:r>
-              <a:rPr lang="en-US" sz="4000" b="1" dirty="0" smtClean="0">
-                <a:solidFill>
-                  <a:srgbClr val="FF0000"/>
-                </a:solidFill>
-                <a:latin typeface="Arial Black" pitchFamily="34" charset="0"/>
-              </a:rPr>
-              <a:t>DRAFT</a:t>
-            </a:r>
-            <a:endParaRPr lang="en-US" sz="4000" b="1" dirty="0">
-              <a:solidFill>
-                <a:srgbClr val="FF0000"/>
-              </a:solidFill>
-              <a:latin typeface="Arial Black" pitchFamily="34" charset="0"/>
-            </a:endParaRPr>
           </a:p>
         </p:txBody>
       </p:sp>
@@ -9124,47 +9536,6 @@
               <a:rPr lang="nb-NO" dirty="0" smtClean="0"/>
               <a:t>(With indicators on each of the phases if possible)</a:t>
             </a:r>
-            <a:endParaRPr lang="nb-NO" dirty="0" smtClean="0"/>
-          </a:p>
-        </p:txBody>
-      </p:sp>
-      <p:sp>
-        <p:nvSpPr>
-          <p:cNvPr id="20" name="TekstSylinder 9"/>
-          <p:cNvSpPr txBox="1"/>
-          <p:nvPr/>
-        </p:nvSpPr>
-        <p:spPr>
-          <a:xfrm rot="18996742">
-            <a:off x="5420137" y="1745194"/>
-            <a:ext cx="2423186" cy="707886"/>
-          </a:xfrm>
-          <a:prstGeom prst="rect">
-            <a:avLst/>
-          </a:prstGeom>
-          <a:noFill/>
-        </p:spPr>
-        <p:txBody>
-          <a:bodyPr wrap="square" rtlCol="0">
-            <a:spAutoFit/>
-          </a:bodyPr>
-          <a:lstStyle/>
-          <a:p>
-            <a:r>
-              <a:rPr lang="en-US" sz="4000" b="1" dirty="0" smtClean="0">
-                <a:solidFill>
-                  <a:srgbClr val="FF0000"/>
-                </a:solidFill>
-                <a:latin typeface="Arial Black" pitchFamily="34" charset="0"/>
-              </a:rPr>
-              <a:t>DRAFT</a:t>
-            </a:r>
-            <a:endParaRPr lang="en-US" sz="4000" b="1" dirty="0">
-              <a:solidFill>
-                <a:srgbClr val="FF0000"/>
-              </a:solidFill>
-              <a:latin typeface="Arial Black" pitchFamily="34" charset="0"/>
-            </a:endParaRPr>
           </a:p>
         </p:txBody>
       </p:sp>
@@ -9973,46 +10344,6 @@
               <a:buChar char="-"/>
             </a:pPr>
             <a:endParaRPr lang="nb-NO" dirty="0" smtClean="0"/>
-          </a:p>
-        </p:txBody>
-      </p:sp>
-      <p:sp>
-        <p:nvSpPr>
-          <p:cNvPr id="20" name="TekstSylinder 9"/>
-          <p:cNvSpPr txBox="1"/>
-          <p:nvPr/>
-        </p:nvSpPr>
-        <p:spPr>
-          <a:xfrm rot="18996742">
-            <a:off x="5420137" y="1745194"/>
-            <a:ext cx="2423186" cy="707886"/>
-          </a:xfrm>
-          <a:prstGeom prst="rect">
-            <a:avLst/>
-          </a:prstGeom>
-          <a:noFill/>
-        </p:spPr>
-        <p:txBody>
-          <a:bodyPr wrap="square" rtlCol="0">
-            <a:spAutoFit/>
-          </a:bodyPr>
-          <a:lstStyle/>
-          <a:p>
-            <a:r>
-              <a:rPr lang="en-US" sz="4000" b="1" dirty="0" smtClean="0">
-                <a:solidFill>
-                  <a:srgbClr val="FF0000"/>
-                </a:solidFill>
-                <a:latin typeface="Arial Black" pitchFamily="34" charset="0"/>
-              </a:rPr>
-              <a:t>DRAFT</a:t>
-            </a:r>
-            <a:endParaRPr lang="en-US" sz="4000" b="1" dirty="0">
-              <a:solidFill>
-                <a:srgbClr val="FF0000"/>
-              </a:solidFill>
-              <a:latin typeface="Arial Black" pitchFamily="34" charset="0"/>
-            </a:endParaRPr>
           </a:p>
         </p:txBody>
       </p:sp>
@@ -10829,46 +11160,6 @@
           </a:p>
         </p:txBody>
       </p:sp>
-      <p:sp>
-        <p:nvSpPr>
-          <p:cNvPr id="20" name="TekstSylinder 9"/>
-          <p:cNvSpPr txBox="1"/>
-          <p:nvPr/>
-        </p:nvSpPr>
-        <p:spPr>
-          <a:xfrm rot="18996742">
-            <a:off x="5420137" y="1745194"/>
-            <a:ext cx="2423186" cy="707886"/>
-          </a:xfrm>
-          <a:prstGeom prst="rect">
-            <a:avLst/>
-          </a:prstGeom>
-          <a:noFill/>
-        </p:spPr>
-        <p:txBody>
-          <a:bodyPr wrap="square" rtlCol="0">
-            <a:spAutoFit/>
-          </a:bodyPr>
-          <a:lstStyle/>
-          <a:p>
-            <a:r>
-              <a:rPr lang="en-US" sz="4000" b="1" dirty="0" smtClean="0">
-                <a:solidFill>
-                  <a:srgbClr val="FF0000"/>
-                </a:solidFill>
-                <a:latin typeface="Arial Black" pitchFamily="34" charset="0"/>
-              </a:rPr>
-              <a:t>DRAFT</a:t>
-            </a:r>
-            <a:endParaRPr lang="en-US" sz="4000" b="1" dirty="0">
-              <a:solidFill>
-                <a:srgbClr val="FF0000"/>
-              </a:solidFill>
-              <a:latin typeface="Arial Black" pitchFamily="34" charset="0"/>
-            </a:endParaRPr>
-          </a:p>
-        </p:txBody>
-      </p:sp>
     </p:spTree>
     <p:extLst>
       <p:ext uri="{BB962C8B-B14F-4D97-AF65-F5344CB8AC3E}">
@@ -11614,15 +11905,7 @@
             </a:pPr>
             <a:r>
               <a:rPr lang="nb-NO" sz="1600" dirty="0" smtClean="0"/>
-              <a:t>Attack conducted by </a:t>
-            </a:r>
-            <a:r>
-              <a:rPr lang="nb-NO" sz="1600" dirty="0" smtClean="0"/>
-              <a:t>the </a:t>
-            </a:r>
-            <a:r>
-              <a:rPr lang="nb-NO" sz="1600" dirty="0" smtClean="0"/>
-              <a:t>manuevering brigades</a:t>
+              <a:t>Attack conducted by the manuevering brigades</a:t>
             </a:r>
           </a:p>
           <a:p>
@@ -11674,46 +11957,6 @@
               <a:buChar char="-"/>
             </a:pPr>
             <a:endParaRPr lang="nb-NO" sz="1600" dirty="0" smtClean="0"/>
-          </a:p>
-        </p:txBody>
-      </p:sp>
-      <p:sp>
-        <p:nvSpPr>
-          <p:cNvPr id="20" name="TekstSylinder 9"/>
-          <p:cNvSpPr txBox="1"/>
-          <p:nvPr/>
-        </p:nvSpPr>
-        <p:spPr>
-          <a:xfrm rot="18996742">
-            <a:off x="5420137" y="1745194"/>
-            <a:ext cx="2423186" cy="707886"/>
-          </a:xfrm>
-          <a:prstGeom prst="rect">
-            <a:avLst/>
-          </a:prstGeom>
-          <a:noFill/>
-        </p:spPr>
-        <p:txBody>
-          <a:bodyPr wrap="square" rtlCol="0">
-            <a:spAutoFit/>
-          </a:bodyPr>
-          <a:lstStyle/>
-          <a:p>
-            <a:r>
-              <a:rPr lang="en-US" sz="4000" b="1" dirty="0" smtClean="0">
-                <a:solidFill>
-                  <a:srgbClr val="FF0000"/>
-                </a:solidFill>
-                <a:latin typeface="Arial Black" pitchFamily="34" charset="0"/>
-              </a:rPr>
-              <a:t>DRAFT</a:t>
-            </a:r>
-            <a:endParaRPr lang="en-US" sz="4000" b="1" dirty="0">
-              <a:solidFill>
-                <a:srgbClr val="FF0000"/>
-              </a:solidFill>
-              <a:latin typeface="Arial Black" pitchFamily="34" charset="0"/>
-            </a:endParaRPr>
           </a:p>
         </p:txBody>
       </p:sp>
@@ -12469,7 +12712,6 @@
               <a:rPr lang="nb-NO" sz="1600" dirty="0" smtClean="0"/>
               <a:t>Combat vehicles taking defensive positions. Most preferrably on high grounds, elevated positions or revetments to be used as static positions for observation and fire</a:t>
             </a:r>
-            <a:endParaRPr lang="nb-NO" sz="1600" dirty="0" smtClean="0"/>
           </a:p>
           <a:p>
             <a:endParaRPr lang="nb-NO" sz="1600" dirty="0" smtClean="0"/>
@@ -12499,7 +12741,6 @@
               <a:rPr lang="nb-NO" sz="1600" dirty="0" smtClean="0"/>
               <a:t>Possible presence of logistics vehicles in/near defensive positions to resupply/service combat vehicles and personnel</a:t>
             </a:r>
-            <a:endParaRPr lang="nb-NO" sz="1600" dirty="0" smtClean="0"/>
           </a:p>
           <a:p>
             <a:pPr marL="285750" indent="-285750">
@@ -12521,46 +12762,6 @@
               <a:buChar char="-"/>
             </a:pPr>
             <a:endParaRPr lang="nb-NO" sz="1600" dirty="0" smtClean="0"/>
-          </a:p>
-        </p:txBody>
-      </p:sp>
-      <p:sp>
-        <p:nvSpPr>
-          <p:cNvPr id="20" name="TekstSylinder 9"/>
-          <p:cNvSpPr txBox="1"/>
-          <p:nvPr/>
-        </p:nvSpPr>
-        <p:spPr>
-          <a:xfrm rot="18996742">
-            <a:off x="5420137" y="1745194"/>
-            <a:ext cx="2423186" cy="707886"/>
-          </a:xfrm>
-          <a:prstGeom prst="rect">
-            <a:avLst/>
-          </a:prstGeom>
-          <a:noFill/>
-        </p:spPr>
-        <p:txBody>
-          <a:bodyPr wrap="square" rtlCol="0">
-            <a:spAutoFit/>
-          </a:bodyPr>
-          <a:lstStyle/>
-          <a:p>
-            <a:r>
-              <a:rPr lang="en-US" sz="4000" b="1" dirty="0" smtClean="0">
-                <a:solidFill>
-                  <a:srgbClr val="FF0000"/>
-                </a:solidFill>
-                <a:latin typeface="Arial Black" pitchFamily="34" charset="0"/>
-              </a:rPr>
-              <a:t>DRAFT</a:t>
-            </a:r>
-            <a:endParaRPr lang="en-US" sz="4000" b="1" dirty="0">
-              <a:solidFill>
-                <a:srgbClr val="FF0000"/>
-              </a:solidFill>
-              <a:latin typeface="Arial Black" pitchFamily="34" charset="0"/>
-            </a:endParaRPr>
           </a:p>
         </p:txBody>
       </p:sp>
@@ -12618,11 +12819,7 @@
           <a:p>
             <a:r>
               <a:rPr lang="en-US" sz="2000" dirty="0" smtClean="0"/>
-              <a:t>USE OF SHOCK </a:t>
-            </a:r>
-            <a:r>
-              <a:rPr lang="en-US" sz="2000" dirty="0" smtClean="0"/>
-              <a:t>BATTALIONS / Special Operations forces</a:t>
+              <a:t>USE OF SHOCK BATTALIONS / Special Operations forces</a:t>
             </a:r>
             <a:endParaRPr lang="en-US" sz="2000" dirty="0"/>
           </a:p>
@@ -13337,7 +13534,6 @@
               <a:rPr lang="nb-NO" sz="1600" dirty="0" smtClean="0"/>
               <a:t>Attack command posts and communication sites to disrupt enemy Command&amp;Control capabilities</a:t>
             </a:r>
-            <a:endParaRPr lang="nb-NO" sz="1600" dirty="0" smtClean="0"/>
           </a:p>
           <a:p>
             <a:endParaRPr lang="nb-NO" sz="1600" dirty="0" smtClean="0"/>
@@ -13392,46 +13588,6 @@
               <a:buChar char="-"/>
             </a:pPr>
             <a:endParaRPr lang="nb-NO" sz="1600" dirty="0" smtClean="0"/>
-          </a:p>
-        </p:txBody>
-      </p:sp>
-      <p:sp>
-        <p:nvSpPr>
-          <p:cNvPr id="20" name="TekstSylinder 9"/>
-          <p:cNvSpPr txBox="1"/>
-          <p:nvPr/>
-        </p:nvSpPr>
-        <p:spPr>
-          <a:xfrm rot="18996742">
-            <a:off x="5420137" y="1745194"/>
-            <a:ext cx="2423186" cy="707886"/>
-          </a:xfrm>
-          <a:prstGeom prst="rect">
-            <a:avLst/>
-          </a:prstGeom>
-          <a:noFill/>
-        </p:spPr>
-        <p:txBody>
-          <a:bodyPr wrap="square" rtlCol="0">
-            <a:spAutoFit/>
-          </a:bodyPr>
-          <a:lstStyle/>
-          <a:p>
-            <a:r>
-              <a:rPr lang="en-US" sz="4000" b="1" dirty="0" smtClean="0">
-                <a:solidFill>
-                  <a:srgbClr val="FF0000"/>
-                </a:solidFill>
-                <a:latin typeface="Arial Black" pitchFamily="34" charset="0"/>
-              </a:rPr>
-              <a:t>DRAFT</a:t>
-            </a:r>
-            <a:endParaRPr lang="en-US" sz="4000" b="1" dirty="0">
-              <a:solidFill>
-                <a:srgbClr val="FF0000"/>
-              </a:solidFill>
-              <a:latin typeface="Arial Black" pitchFamily="34" charset="0"/>
-            </a:endParaRPr>
           </a:p>
         </p:txBody>
       </p:sp>

</xml_diff>

<commit_message>
chg: Added OPAR INTREP 001 and 004
</commit_message>
<xml_diff>
--- a/OPAR/WORKSPACE/INTREP VIS OPAR-001 - Syrian ground combat tactics.pptx
+++ b/OPAR/WORKSPACE/INTREP VIS OPAR-001 - Syrian ground combat tactics.pptx
@@ -203,7 +203,7 @@
             <a:fld id="{40637A30-8EE1-4060-9976-8832FC89EE34}" type="datetimeFigureOut">
               <a:rPr lang="nb-NO" smtClean="0"/>
               <a:pPr/>
-              <a:t>31.08.2020</a:t>
+              <a:t>10.09.2020</a:t>
             </a:fld>
             <a:endParaRPr lang="nb-NO"/>
           </a:p>
@@ -374,7 +374,7 @@
     </p:spTree>
     <p:extLst>
       <p:ext uri="{BB962C8B-B14F-4D97-AF65-F5344CB8AC3E}">
-        <p14:creationId xmlns:p14="http://schemas.microsoft.com/office/powerpoint/2010/main" val="2256331300"/>
+        <p14:creationId xmlns:p14="http://schemas.microsoft.com/office/powerpoint/2010/main" xmlns="" val="2256331300"/>
       </p:ext>
     </p:extLst>
   </p:cSld>
@@ -3890,32 +3890,6 @@
           <a:chExt cx="0" cy="0"/>
         </a:xfrm>
       </p:grpSpPr>
-      <p:pic>
-        <p:nvPicPr>
-          <p:cNvPr id="1026" name="Picture 2" descr="https://cdn.discordapp.com/attachments/287519461894782976/627800830069964800/Virtual_Intelligence_Service_Logo.PNG"/>
-          <p:cNvPicPr>
-            <a:picLocks noChangeAspect="1" noChangeArrowheads="1"/>
-          </p:cNvPicPr>
-          <p:nvPr/>
-        </p:nvPicPr>
-        <p:blipFill>
-          <a:blip r:embed="rId3" cstate="print"/>
-          <a:srcRect b="10000"/>
-          <a:stretch>
-            <a:fillRect/>
-          </a:stretch>
-        </p:blipFill>
-        <p:spPr bwMode="auto">
-          <a:xfrm>
-            <a:off x="-9765592" y="344003"/>
-            <a:ext cx="8951266" cy="1822703"/>
-          </a:xfrm>
-          <a:prstGeom prst="rect">
-            <a:avLst/>
-          </a:prstGeom>
-          <a:noFill/>
-        </p:spPr>
-      </p:pic>
       <p:sp>
         <p:nvSpPr>
           <p:cNvPr id="3" name="TekstSylinder 2"/>
@@ -4041,7 +4015,14 @@
                 <a:latin typeface="Arial" pitchFamily="34" charset="0"/>
                 <a:cs typeface="Arial" pitchFamily="34" charset="0"/>
               </a:rPr>
-              <a:t>Published: YYYY-MM-DD</a:t>
+              <a:t>Published: </a:t>
+            </a:r>
+            <a:r>
+              <a:rPr lang="en-US" sz="1400" dirty="0" smtClean="0">
+                <a:latin typeface="Arial" pitchFamily="34" charset="0"/>
+                <a:cs typeface="Arial" pitchFamily="34" charset="0"/>
+              </a:rPr>
+              <a:t>2020-09-10</a:t>
             </a:r>
             <a:endParaRPr lang="en-US" sz="1400" dirty="0">
               <a:latin typeface="Arial" pitchFamily="34" charset="0"/>
@@ -4078,7 +4059,14 @@
                 <a:latin typeface="Arial" pitchFamily="34" charset="0"/>
                 <a:cs typeface="Arial" pitchFamily="34" charset="0"/>
               </a:rPr>
-              <a:t>Version: X.X</a:t>
+              <a:t>Version: </a:t>
+            </a:r>
+            <a:r>
+              <a:rPr lang="en-US" sz="1400" dirty="0" smtClean="0">
+                <a:latin typeface="Arial" pitchFamily="34" charset="0"/>
+                <a:cs typeface="Arial" pitchFamily="34" charset="0"/>
+              </a:rPr>
+              <a:t>1.0</a:t>
             </a:r>
             <a:endParaRPr lang="en-US" sz="1400" dirty="0">
               <a:latin typeface="Arial" pitchFamily="34" charset="0"/>
@@ -4096,7 +4084,7 @@
           <p:nvPr/>
         </p:nvPicPr>
         <p:blipFill>
-          <a:blip r:embed="rId4" cstate="print"/>
+          <a:blip r:embed="rId3" cstate="print"/>
           <a:srcRect/>
           <a:stretch>
             <a:fillRect/>
@@ -4162,46 +4150,6 @@
                 <a:srgbClr val="35261F"/>
               </a:solidFill>
               <a:latin typeface="Constantia" pitchFamily="18" charset="0"/>
-            </a:endParaRPr>
-          </a:p>
-        </p:txBody>
-      </p:sp>
-      <p:sp>
-        <p:nvSpPr>
-          <p:cNvPr id="10" name="TekstSylinder 9"/>
-          <p:cNvSpPr txBox="1"/>
-          <p:nvPr/>
-        </p:nvSpPr>
-        <p:spPr>
-          <a:xfrm rot="18996742">
-            <a:off x="3983967" y="3807371"/>
-            <a:ext cx="2423186" cy="707886"/>
-          </a:xfrm>
-          <a:prstGeom prst="rect">
-            <a:avLst/>
-          </a:prstGeom>
-          <a:noFill/>
-        </p:spPr>
-        <p:txBody>
-          <a:bodyPr wrap="square" rtlCol="0">
-            <a:spAutoFit/>
-          </a:bodyPr>
-          <a:lstStyle/>
-          <a:p>
-            <a:r>
-              <a:rPr lang="en-US" sz="4000" b="1" dirty="0" smtClean="0">
-                <a:solidFill>
-                  <a:srgbClr val="FF0000"/>
-                </a:solidFill>
-                <a:latin typeface="Arial Black" pitchFamily="34" charset="0"/>
-              </a:rPr>
-              <a:t>DRAFT</a:t>
-            </a:r>
-            <a:endParaRPr lang="en-US" sz="4000" b="1" dirty="0">
-              <a:solidFill>
-                <a:srgbClr val="FF0000"/>
-              </a:solidFill>
-              <a:latin typeface="Arial Black" pitchFamily="34" charset="0"/>
             </a:endParaRPr>
           </a:p>
         </p:txBody>
@@ -4974,7 +4922,7 @@
           <p:nvPr>
             <p:extLst>
               <p:ext uri="{D42A27DB-BD31-4B8C-83A1-F6EECF244321}">
-                <p14:modId xmlns:p14="http://schemas.microsoft.com/office/powerpoint/2010/main" val="253851099"/>
+                <p14:modId xmlns:p14="http://schemas.microsoft.com/office/powerpoint/2010/main" xmlns="" val="253851099"/>
               </p:ext>
             </p:extLst>
           </p:nvPr>
@@ -5356,7 +5304,6 @@
                         <a:rPr lang="nb-NO" sz="1200" dirty="0" smtClean="0"/>
                         <a:t>offensive within 0-48 hrs</a:t>
                       </a:r>
-                      <a:endParaRPr lang="nb-NO" sz="1200" dirty="0" smtClean="0"/>
                     </a:p>
                   </a:txBody>
                   <a:tcPr anchor="ctr"/>
@@ -5396,15 +5343,7 @@
                       </a:pPr>
                       <a:r>
                         <a:rPr lang="nb-NO" sz="1200" dirty="0" smtClean="0"/>
-                        <a:t>Upcoming </a:t>
-                      </a:r>
-                      <a:r>
-                        <a:rPr lang="nb-NO" sz="1200" dirty="0" smtClean="0"/>
-                        <a:t>regiment-level offensive within 0-24 </a:t>
-                      </a:r>
-                      <a:r>
-                        <a:rPr lang="nb-NO" sz="1200" dirty="0" smtClean="0"/>
-                        <a:t>hrs</a:t>
+                        <a:t>Upcoming regiment-level offensive within 0-24 hrs</a:t>
                       </a:r>
                     </a:p>
                   </a:txBody>
@@ -5425,11 +5364,7 @@
                       </a:r>
                       <a:r>
                         <a:rPr lang="nb-NO" sz="1200" baseline="0" dirty="0" smtClean="0"/>
-                        <a:t> of </a:t>
-                      </a:r>
-                      <a:r>
-                        <a:rPr lang="nb-NO" sz="1200" baseline="0" dirty="0" smtClean="0"/>
-                        <a:t>regiment-level supply</a:t>
+                        <a:t> of regiment-level supply</a:t>
                       </a:r>
                       <a:endParaRPr lang="nb-NO" sz="1200" dirty="0" smtClean="0"/>
                     </a:p>
@@ -7439,64 +7374,6 @@
       </p:sp>
       <p:sp>
         <p:nvSpPr>
-          <p:cNvPr id="47" name="Avrundet rektangel 46"/>
-          <p:cNvSpPr/>
-          <p:nvPr/>
-        </p:nvSpPr>
-        <p:spPr>
-          <a:xfrm>
-            <a:off x="1763141" y="2737484"/>
-            <a:ext cx="749764" cy="410330"/>
-          </a:xfrm>
-          <a:prstGeom prst="roundRect">
-            <a:avLst/>
-          </a:prstGeom>
-          <a:solidFill>
-            <a:schemeClr val="accent2"/>
-          </a:solidFill>
-          <a:ln w="12700">
-            <a:solidFill>
-              <a:schemeClr val="tx1"/>
-            </a:solidFill>
-          </a:ln>
-        </p:spPr>
-        <p:style>
-          <a:lnRef idx="2">
-            <a:schemeClr val="accent1">
-              <a:shade val="50000"/>
-            </a:schemeClr>
-          </a:lnRef>
-          <a:fillRef idx="1">
-            <a:schemeClr val="accent1"/>
-          </a:fillRef>
-          <a:effectRef idx="0">
-            <a:schemeClr val="accent1"/>
-          </a:effectRef>
-          <a:fontRef idx="minor">
-            <a:schemeClr val="lt1"/>
-          </a:fontRef>
-        </p:style>
-        <p:txBody>
-          <a:bodyPr rtlCol="0" anchor="ctr"/>
-          <a:lstStyle/>
-          <a:p>
-            <a:pPr algn="ctr"/>
-            <a:r>
-              <a:rPr lang="nb-NO" sz="1050" dirty="0" smtClean="0">
-                <a:latin typeface="Arial" pitchFamily="34" charset="0"/>
-                <a:cs typeface="Arial" pitchFamily="34" charset="0"/>
-              </a:rPr>
-              <a:t>ARTY BN</a:t>
-            </a:r>
-            <a:endParaRPr lang="nb-NO" sz="1050" dirty="0">
-              <a:latin typeface="Arial" pitchFamily="34" charset="0"/>
-              <a:cs typeface="Arial" pitchFamily="34" charset="0"/>
-            </a:endParaRPr>
-          </a:p>
-        </p:txBody>
-      </p:sp>
-      <p:sp>
-        <p:nvSpPr>
           <p:cNvPr id="48" name="Avrundet rektangel 47"/>
           <p:cNvSpPr/>
           <p:nvPr/>
@@ -8379,7 +8256,7 @@
         <p:spPr>
           <a:xfrm>
             <a:off x="2512905" y="2153523"/>
-            <a:ext cx="1483031" cy="1613982"/>
+            <a:ext cx="1555039" cy="1613982"/>
           </a:xfrm>
           <a:prstGeom prst="ellipse">
             <a:avLst/>
@@ -8476,9 +8353,9 @@
           <p:nvPr/>
         </p:nvCxnSpPr>
         <p:spPr>
-          <a:xfrm flipH="1" flipV="1">
-            <a:off x="3778751" y="3531143"/>
-            <a:ext cx="13307" cy="441415"/>
+          <a:xfrm flipV="1">
+            <a:off x="3792058" y="3531143"/>
+            <a:ext cx="48156" cy="441415"/>
           </a:xfrm>
           <a:prstGeom prst="straightConnector1">
             <a:avLst/>
@@ -8763,10 +8640,184 @@
           </a:p>
         </p:txBody>
       </p:sp>
+      <p:sp>
+        <p:nvSpPr>
+          <p:cNvPr id="32" name="Avrundet rektangel 31"/>
+          <p:cNvSpPr/>
+          <p:nvPr/>
+        </p:nvSpPr>
+        <p:spPr>
+          <a:xfrm>
+            <a:off x="1619672" y="2139702"/>
+            <a:ext cx="504056" cy="375049"/>
+          </a:xfrm>
+          <a:prstGeom prst="roundRect">
+            <a:avLst/>
+          </a:prstGeom>
+          <a:solidFill>
+            <a:schemeClr val="accent2"/>
+          </a:solidFill>
+          <a:ln w="12700">
+            <a:solidFill>
+              <a:schemeClr val="tx1"/>
+            </a:solidFill>
+          </a:ln>
+        </p:spPr>
+        <p:style>
+          <a:lnRef idx="2">
+            <a:schemeClr val="accent1">
+              <a:shade val="50000"/>
+            </a:schemeClr>
+          </a:lnRef>
+          <a:fillRef idx="1">
+            <a:schemeClr val="accent1"/>
+          </a:fillRef>
+          <a:effectRef idx="0">
+            <a:schemeClr val="accent1"/>
+          </a:effectRef>
+          <a:fontRef idx="minor">
+            <a:schemeClr val="lt1"/>
+          </a:fontRef>
+        </p:style>
+        <p:txBody>
+          <a:bodyPr rtlCol="0" anchor="ctr"/>
+          <a:lstStyle/>
+          <a:p>
+            <a:pPr algn="ctr"/>
+            <a:r>
+              <a:rPr lang="nb-NO" sz="800" dirty="0" smtClean="0">
+                <a:latin typeface="Arial" pitchFamily="34" charset="0"/>
+                <a:cs typeface="Arial" pitchFamily="34" charset="0"/>
+              </a:rPr>
+              <a:t>ARTY BN</a:t>
+            </a:r>
+            <a:endParaRPr lang="nb-NO" sz="800" dirty="0">
+              <a:latin typeface="Arial" pitchFamily="34" charset="0"/>
+              <a:cs typeface="Arial" pitchFamily="34" charset="0"/>
+            </a:endParaRPr>
+          </a:p>
+        </p:txBody>
+      </p:sp>
+      <p:sp>
+        <p:nvSpPr>
+          <p:cNvPr id="34" name="Avrundet rektangel 33"/>
+          <p:cNvSpPr/>
+          <p:nvPr/>
+        </p:nvSpPr>
+        <p:spPr>
+          <a:xfrm>
+            <a:off x="1619672" y="3795886"/>
+            <a:ext cx="504056" cy="375049"/>
+          </a:xfrm>
+          <a:prstGeom prst="roundRect">
+            <a:avLst/>
+          </a:prstGeom>
+          <a:solidFill>
+            <a:schemeClr val="accent2"/>
+          </a:solidFill>
+          <a:ln w="12700">
+            <a:solidFill>
+              <a:schemeClr val="tx1"/>
+            </a:solidFill>
+          </a:ln>
+        </p:spPr>
+        <p:style>
+          <a:lnRef idx="2">
+            <a:schemeClr val="accent1">
+              <a:shade val="50000"/>
+            </a:schemeClr>
+          </a:lnRef>
+          <a:fillRef idx="1">
+            <a:schemeClr val="accent1"/>
+          </a:fillRef>
+          <a:effectRef idx="0">
+            <a:schemeClr val="accent1"/>
+          </a:effectRef>
+          <a:fontRef idx="minor">
+            <a:schemeClr val="lt1"/>
+          </a:fontRef>
+        </p:style>
+        <p:txBody>
+          <a:bodyPr rtlCol="0" anchor="ctr"/>
+          <a:lstStyle/>
+          <a:p>
+            <a:pPr algn="ctr"/>
+            <a:r>
+              <a:rPr lang="nb-NO" sz="800" dirty="0" smtClean="0">
+                <a:latin typeface="Arial" pitchFamily="34" charset="0"/>
+                <a:cs typeface="Arial" pitchFamily="34" charset="0"/>
+              </a:rPr>
+              <a:t>ARTY BN</a:t>
+            </a:r>
+            <a:endParaRPr lang="nb-NO" sz="800" dirty="0">
+              <a:latin typeface="Arial" pitchFamily="34" charset="0"/>
+              <a:cs typeface="Arial" pitchFamily="34" charset="0"/>
+            </a:endParaRPr>
+          </a:p>
+        </p:txBody>
+      </p:sp>
+      <p:sp>
+        <p:nvSpPr>
+          <p:cNvPr id="35" name="Avrundet rektangel 34"/>
+          <p:cNvSpPr/>
+          <p:nvPr/>
+        </p:nvSpPr>
+        <p:spPr>
+          <a:xfrm>
+            <a:off x="3453780" y="3075806"/>
+            <a:ext cx="504056" cy="375049"/>
+          </a:xfrm>
+          <a:prstGeom prst="roundRect">
+            <a:avLst/>
+          </a:prstGeom>
+          <a:solidFill>
+            <a:schemeClr val="accent2"/>
+          </a:solidFill>
+          <a:ln w="12700">
+            <a:solidFill>
+              <a:schemeClr val="tx1"/>
+            </a:solidFill>
+          </a:ln>
+        </p:spPr>
+        <p:style>
+          <a:lnRef idx="2">
+            <a:schemeClr val="accent1">
+              <a:shade val="50000"/>
+            </a:schemeClr>
+          </a:lnRef>
+          <a:fillRef idx="1">
+            <a:schemeClr val="accent1"/>
+          </a:fillRef>
+          <a:effectRef idx="0">
+            <a:schemeClr val="accent1"/>
+          </a:effectRef>
+          <a:fontRef idx="minor">
+            <a:schemeClr val="lt1"/>
+          </a:fontRef>
+        </p:style>
+        <p:txBody>
+          <a:bodyPr rtlCol="0" anchor="ctr"/>
+          <a:lstStyle/>
+          <a:p>
+            <a:pPr algn="ctr"/>
+            <a:r>
+              <a:rPr lang="nb-NO" sz="800" dirty="0" smtClean="0">
+                <a:latin typeface="Arial" pitchFamily="34" charset="0"/>
+                <a:cs typeface="Arial" pitchFamily="34" charset="0"/>
+              </a:rPr>
+              <a:t>ARTY BN</a:t>
+            </a:r>
+            <a:endParaRPr lang="nb-NO" sz="800" dirty="0">
+              <a:latin typeface="Arial" pitchFamily="34" charset="0"/>
+              <a:cs typeface="Arial" pitchFamily="34" charset="0"/>
+            </a:endParaRPr>
+          </a:p>
+        </p:txBody>
+      </p:sp>
     </p:spTree>
     <p:extLst>
       <p:ext uri="{BB962C8B-B14F-4D97-AF65-F5344CB8AC3E}">
-        <p14:creationId xmlns:p14="http://schemas.microsoft.com/office/powerpoint/2010/main" val="1177541819"/>
+        <p14:creationId xmlns:p14="http://schemas.microsoft.com/office/powerpoint/2010/main" xmlns="" val="1177541819"/>
       </p:ext>
     </p:extLst>
   </p:cSld>
@@ -10350,7 +10401,7 @@
     </p:spTree>
     <p:extLst>
       <p:ext uri="{BB962C8B-B14F-4D97-AF65-F5344CB8AC3E}">
-        <p14:creationId xmlns:p14="http://schemas.microsoft.com/office/powerpoint/2010/main" val="390204938"/>
+        <p14:creationId xmlns:p14="http://schemas.microsoft.com/office/powerpoint/2010/main" xmlns="" val="390204938"/>
       </p:ext>
     </p:extLst>
   </p:cSld>
@@ -11163,7 +11214,7 @@
     </p:spTree>
     <p:extLst>
       <p:ext uri="{BB962C8B-B14F-4D97-AF65-F5344CB8AC3E}">
-        <p14:creationId xmlns:p14="http://schemas.microsoft.com/office/powerpoint/2010/main" val="4063869597"/>
+        <p14:creationId xmlns:p14="http://schemas.microsoft.com/office/powerpoint/2010/main" xmlns="" val="4063869597"/>
       </p:ext>
     </p:extLst>
   </p:cSld>
@@ -11963,7 +12014,7 @@
     </p:spTree>
     <p:extLst>
       <p:ext uri="{BB962C8B-B14F-4D97-AF65-F5344CB8AC3E}">
-        <p14:creationId xmlns:p14="http://schemas.microsoft.com/office/powerpoint/2010/main" val="3349576044"/>
+        <p14:creationId xmlns:p14="http://schemas.microsoft.com/office/powerpoint/2010/main" xmlns="" val="3349576044"/>
       </p:ext>
     </p:extLst>
   </p:cSld>

</xml_diff>

<commit_message>
chg: Updated metadata in various reports
</commit_message>
<xml_diff>
--- a/OPAR/WORKSPACE/INTREP VIS OPAR-001 - Syrian ground combat tactics.pptx
+++ b/OPAR/WORKSPACE/INTREP VIS OPAR-001 - Syrian ground combat tactics.pptx
@@ -374,7 +374,7 @@
     </p:spTree>
     <p:extLst>
       <p:ext uri="{BB962C8B-B14F-4D97-AF65-F5344CB8AC3E}">
-        <p14:creationId xmlns:p14="http://schemas.microsoft.com/office/powerpoint/2010/main" xmlns="" val="2256331300"/>
+        <p14:creationId xmlns="" xmlns:p14="http://schemas.microsoft.com/office/powerpoint/2010/main" val="2256331300"/>
       </p:ext>
     </p:extLst>
   </p:cSld>
@@ -4015,58 +4015,44 @@
                 <a:latin typeface="Arial" pitchFamily="34" charset="0"/>
                 <a:cs typeface="Arial" pitchFamily="34" charset="0"/>
               </a:rPr>
-              <a:t>Published: </a:t>
-            </a:r>
+              <a:t>Published: 2020-09-10</a:t>
+            </a:r>
+            <a:endParaRPr lang="en-US" sz="1400" dirty="0">
+              <a:latin typeface="Arial" pitchFamily="34" charset="0"/>
+              <a:cs typeface="Arial" pitchFamily="34" charset="0"/>
+            </a:endParaRPr>
+          </a:p>
+        </p:txBody>
+      </p:sp>
+      <p:sp>
+        <p:nvSpPr>
+          <p:cNvPr id="9" name="TekstSylinder 8"/>
+          <p:cNvSpPr txBox="1"/>
+          <p:nvPr/>
+        </p:nvSpPr>
+        <p:spPr>
+          <a:xfrm>
+            <a:off x="1371644" y="4585046"/>
+            <a:ext cx="6784754" cy="307777"/>
+          </a:xfrm>
+          <a:prstGeom prst="rect">
+            <a:avLst/>
+          </a:prstGeom>
+          <a:noFill/>
+        </p:spPr>
+        <p:txBody>
+          <a:bodyPr wrap="square" rtlCol="0">
+            <a:spAutoFit/>
+          </a:bodyPr>
+          <a:lstStyle/>
+          <a:p>
+            <a:pPr algn="ctr"/>
             <a:r>
               <a:rPr lang="en-US" sz="1400" dirty="0" smtClean="0">
                 <a:latin typeface="Arial" pitchFamily="34" charset="0"/>
                 <a:cs typeface="Arial" pitchFamily="34" charset="0"/>
               </a:rPr>
-              <a:t>2020-09-10</a:t>
-            </a:r>
-            <a:endParaRPr lang="en-US" sz="1400" dirty="0">
-              <a:latin typeface="Arial" pitchFamily="34" charset="0"/>
-              <a:cs typeface="Arial" pitchFamily="34" charset="0"/>
-            </a:endParaRPr>
-          </a:p>
-        </p:txBody>
-      </p:sp>
-      <p:sp>
-        <p:nvSpPr>
-          <p:cNvPr id="9" name="TekstSylinder 8"/>
-          <p:cNvSpPr txBox="1"/>
-          <p:nvPr/>
-        </p:nvSpPr>
-        <p:spPr>
-          <a:xfrm>
-            <a:off x="1371644" y="4585046"/>
-            <a:ext cx="6784754" cy="307777"/>
-          </a:xfrm>
-          <a:prstGeom prst="rect">
-            <a:avLst/>
-          </a:prstGeom>
-          <a:noFill/>
-        </p:spPr>
-        <p:txBody>
-          <a:bodyPr wrap="square" rtlCol="0">
-            <a:spAutoFit/>
-          </a:bodyPr>
-          <a:lstStyle/>
-          <a:p>
-            <a:pPr algn="ctr"/>
-            <a:r>
-              <a:rPr lang="en-US" sz="1400" dirty="0" smtClean="0">
-                <a:latin typeface="Arial" pitchFamily="34" charset="0"/>
-                <a:cs typeface="Arial" pitchFamily="34" charset="0"/>
-              </a:rPr>
-              <a:t>Version: </a:t>
-            </a:r>
-            <a:r>
-              <a:rPr lang="en-US" sz="1400" dirty="0" smtClean="0">
-                <a:latin typeface="Arial" pitchFamily="34" charset="0"/>
-                <a:cs typeface="Arial" pitchFamily="34" charset="0"/>
-              </a:rPr>
-              <a:t>1.0</a:t>
+              <a:t>Version: 1.0</a:t>
             </a:r>
             <a:endParaRPr lang="en-US" sz="1400" dirty="0">
               <a:latin typeface="Arial" pitchFamily="34" charset="0"/>
@@ -4922,7 +4908,7 @@
           <p:nvPr>
             <p:extLst>
               <p:ext uri="{D42A27DB-BD31-4B8C-83A1-F6EECF244321}">
-                <p14:modId xmlns:p14="http://schemas.microsoft.com/office/powerpoint/2010/main" xmlns="" val="253851099"/>
+                <p14:modId xmlns="" xmlns:p14="http://schemas.microsoft.com/office/powerpoint/2010/main" val="253851099"/>
               </p:ext>
             </p:extLst>
           </p:nvPr>
@@ -8817,7 +8803,7 @@
     </p:spTree>
     <p:extLst>
       <p:ext uri="{BB962C8B-B14F-4D97-AF65-F5344CB8AC3E}">
-        <p14:creationId xmlns:p14="http://schemas.microsoft.com/office/powerpoint/2010/main" xmlns="" val="1177541819"/>
+        <p14:creationId xmlns="" xmlns:p14="http://schemas.microsoft.com/office/powerpoint/2010/main" val="1177541819"/>
       </p:ext>
     </p:extLst>
   </p:cSld>
@@ -10401,7 +10387,7 @@
     </p:spTree>
     <p:extLst>
       <p:ext uri="{BB962C8B-B14F-4D97-AF65-F5344CB8AC3E}">
-        <p14:creationId xmlns:p14="http://schemas.microsoft.com/office/powerpoint/2010/main" xmlns="" val="390204938"/>
+        <p14:creationId xmlns="" xmlns:p14="http://schemas.microsoft.com/office/powerpoint/2010/main" val="390204938"/>
       </p:ext>
     </p:extLst>
   </p:cSld>
@@ -11214,7 +11200,7 @@
     </p:spTree>
     <p:extLst>
       <p:ext uri="{BB962C8B-B14F-4D97-AF65-F5344CB8AC3E}">
-        <p14:creationId xmlns:p14="http://schemas.microsoft.com/office/powerpoint/2010/main" xmlns="" val="4063869597"/>
+        <p14:creationId xmlns="" xmlns:p14="http://schemas.microsoft.com/office/powerpoint/2010/main" val="4063869597"/>
       </p:ext>
     </p:extLst>
   </p:cSld>
@@ -12014,7 +12000,7 @@
     </p:spTree>
     <p:extLst>
       <p:ext uri="{BB962C8B-B14F-4D97-AF65-F5344CB8AC3E}">
-        <p14:creationId xmlns:p14="http://schemas.microsoft.com/office/powerpoint/2010/main" xmlns="" val="3349576044"/>
+        <p14:creationId xmlns="" xmlns:p14="http://schemas.microsoft.com/office/powerpoint/2010/main" val="3349576044"/>
       </p:ext>
     </p:extLst>
   </p:cSld>

</xml_diff>